<commit_message>
adding new files for namedtuple and function calling
</commit_message>
<xml_diff>
--- a/Class-3/Classes and Objects.pptx
+++ b/Class-3/Classes and Objects.pptx
@@ -289,7 +289,7 @@
           <a:p>
             <a:fld id="{90F99ACA-4DBB-4AED-BCF4-7CDED2803A73}" type="datetimeFigureOut">
               <a:rPr lang="en-US" smtClean="0"/>
-              <a:t>2/12/2025</a:t>
+              <a:t>2/26/2025</a:t>
             </a:fld>
             <a:endParaRPr lang="en-US"/>
           </a:p>
@@ -556,7 +556,7 @@
           <a:p>
             <a:fld id="{90F99ACA-4DBB-4AED-BCF4-7CDED2803A73}" type="datetimeFigureOut">
               <a:rPr lang="en-US" smtClean="0"/>
-              <a:t>2/12/2025</a:t>
+              <a:t>2/26/2025</a:t>
             </a:fld>
             <a:endParaRPr lang="en-US"/>
           </a:p>
@@ -787,7 +787,7 @@
           <a:p>
             <a:fld id="{90F99ACA-4DBB-4AED-BCF4-7CDED2803A73}" type="datetimeFigureOut">
               <a:rPr lang="en-US" smtClean="0"/>
-              <a:t>2/12/2025</a:t>
+              <a:t>2/26/2025</a:t>
             </a:fld>
             <a:endParaRPr lang="en-US"/>
           </a:p>
@@ -1097,7 +1097,7 @@
           <a:p>
             <a:fld id="{90F99ACA-4DBB-4AED-BCF4-7CDED2803A73}" type="datetimeFigureOut">
               <a:rPr lang="en-US" smtClean="0"/>
-              <a:t>2/12/2025</a:t>
+              <a:t>2/26/2025</a:t>
             </a:fld>
             <a:endParaRPr lang="en-US"/>
           </a:p>
@@ -1570,7 +1570,7 @@
           <a:p>
             <a:fld id="{90F99ACA-4DBB-4AED-BCF4-7CDED2803A73}" type="datetimeFigureOut">
               <a:rPr lang="en-US" smtClean="0"/>
-              <a:t>2/12/2025</a:t>
+              <a:t>2/26/2025</a:t>
             </a:fld>
             <a:endParaRPr lang="en-US"/>
           </a:p>
@@ -2117,7 +2117,7 @@
           <a:p>
             <a:fld id="{90F99ACA-4DBB-4AED-BCF4-7CDED2803A73}" type="datetimeFigureOut">
               <a:rPr lang="en-US" smtClean="0"/>
-              <a:t>2/12/2025</a:t>
+              <a:t>2/26/2025</a:t>
             </a:fld>
             <a:endParaRPr lang="en-US"/>
           </a:p>
@@ -2891,7 +2891,7 @@
           <a:p>
             <a:fld id="{90F99ACA-4DBB-4AED-BCF4-7CDED2803A73}" type="datetimeFigureOut">
               <a:rPr lang="en-US" smtClean="0"/>
-              <a:t>2/12/2025</a:t>
+              <a:t>2/26/2025</a:t>
             </a:fld>
             <a:endParaRPr lang="en-US"/>
           </a:p>
@@ -3066,7 +3066,7 @@
           <a:p>
             <a:fld id="{90F99ACA-4DBB-4AED-BCF4-7CDED2803A73}" type="datetimeFigureOut">
               <a:rPr lang="en-US" smtClean="0"/>
-              <a:t>2/12/2025</a:t>
+              <a:t>2/26/2025</a:t>
             </a:fld>
             <a:endParaRPr lang="en-US"/>
           </a:p>
@@ -3289,7 +3289,7 @@
           <a:p>
             <a:fld id="{90F99ACA-4DBB-4AED-BCF4-7CDED2803A73}" type="datetimeFigureOut">
               <a:rPr lang="en-US" smtClean="0"/>
-              <a:t>2/12/2025</a:t>
+              <a:t>2/26/2025</a:t>
             </a:fld>
             <a:endParaRPr lang="en-US"/>
           </a:p>
@@ -3469,7 +3469,7 @@
           <a:p>
             <a:fld id="{90F99ACA-4DBB-4AED-BCF4-7CDED2803A73}" type="datetimeFigureOut">
               <a:rPr lang="en-US" smtClean="0"/>
-              <a:t>2/12/2025</a:t>
+              <a:t>2/26/2025</a:t>
             </a:fld>
             <a:endParaRPr lang="en-US"/>
           </a:p>
@@ -3758,7 +3758,7 @@
           <a:p>
             <a:fld id="{90F99ACA-4DBB-4AED-BCF4-7CDED2803A73}" type="datetimeFigureOut">
               <a:rPr lang="en-US" smtClean="0"/>
-              <a:t>2/12/2025</a:t>
+              <a:t>2/26/2025</a:t>
             </a:fld>
             <a:endParaRPr lang="en-US"/>
           </a:p>
@@ -4000,7 +4000,7 @@
           <a:p>
             <a:fld id="{90F99ACA-4DBB-4AED-BCF4-7CDED2803A73}" type="datetimeFigureOut">
               <a:rPr lang="en-US" smtClean="0"/>
-              <a:t>2/12/2025</a:t>
+              <a:t>2/26/2025</a:t>
             </a:fld>
             <a:endParaRPr lang="en-US"/>
           </a:p>
@@ -4379,7 +4379,7 @@
           <a:p>
             <a:fld id="{90F99ACA-4DBB-4AED-BCF4-7CDED2803A73}" type="datetimeFigureOut">
               <a:rPr lang="en-US" smtClean="0"/>
-              <a:t>2/12/2025</a:t>
+              <a:t>2/26/2025</a:t>
             </a:fld>
             <a:endParaRPr lang="en-US"/>
           </a:p>
@@ -4497,7 +4497,7 @@
           <a:p>
             <a:fld id="{90F99ACA-4DBB-4AED-BCF4-7CDED2803A73}" type="datetimeFigureOut">
               <a:rPr lang="en-US" smtClean="0"/>
-              <a:t>2/12/2025</a:t>
+              <a:t>2/26/2025</a:t>
             </a:fld>
             <a:endParaRPr lang="en-US"/>
           </a:p>
@@ -4592,7 +4592,7 @@
           <a:p>
             <a:fld id="{90F99ACA-4DBB-4AED-BCF4-7CDED2803A73}" type="datetimeFigureOut">
               <a:rPr lang="en-US" smtClean="0"/>
-              <a:t>2/12/2025</a:t>
+              <a:t>2/26/2025</a:t>
             </a:fld>
             <a:endParaRPr lang="en-US"/>
           </a:p>
@@ -4841,7 +4841,7 @@
           <a:p>
             <a:fld id="{90F99ACA-4DBB-4AED-BCF4-7CDED2803A73}" type="datetimeFigureOut">
               <a:rPr lang="en-US" smtClean="0"/>
-              <a:t>2/12/2025</a:t>
+              <a:t>2/26/2025</a:t>
             </a:fld>
             <a:endParaRPr lang="en-US"/>
           </a:p>
@@ -5098,7 +5098,7 @@
           <a:p>
             <a:fld id="{90F99ACA-4DBB-4AED-BCF4-7CDED2803A73}" type="datetimeFigureOut">
               <a:rPr lang="en-US" smtClean="0"/>
-              <a:t>2/12/2025</a:t>
+              <a:t>2/26/2025</a:t>
             </a:fld>
             <a:endParaRPr lang="en-US"/>
           </a:p>
@@ -5341,7 +5341,7 @@
           <a:p>
             <a:fld id="{90F99ACA-4DBB-4AED-BCF4-7CDED2803A73}" type="datetimeFigureOut">
               <a:rPr lang="en-US" smtClean="0"/>
-              <a:t>2/12/2025</a:t>
+              <a:t>2/26/2025</a:t>
             </a:fld>
             <a:endParaRPr lang="en-US"/>
           </a:p>
@@ -5889,7 +5889,7 @@
           <a:p>
             <a:r>
               <a:rPr lang="en-US" dirty="0"/>
-              <a:t>Python is an Object Oriented Language which means that the code can be divided into individual code, namely objects. </a:t>
+              <a:t>Python is an Object-Oriented Language which means that the code can be divided into individual code, namely objects. </a:t>
             </a:r>
           </a:p>
           <a:p>
@@ -6354,7 +6354,7 @@
           <a:p>
             <a:r>
               <a:rPr lang="en-US" dirty="0"/>
-              <a:t>In Python, we can also specify a method that gets called when our object gets destroyed or deleted and is no longer needed. This is called as destructor and it is opposite of the constructor. </a:t>
+              <a:t>In Python, we can also specify a method that gets called when our object gets destroyed or deleted and is no longer needed. This is called as destructor, and it is opposite of the constructor. </a:t>
             </a:r>
           </a:p>
           <a:p>

</xml_diff>